<commit_message>
add bash loop, update presentation
</commit_message>
<xml_diff>
--- a/presentation/Application Container Apps.pptx
+++ b/presentation/Application Container Apps.pptx
@@ -13699,6 +13699,41 @@
             </a:r>
           </a:p>
           <a:p>
+            <a:r>
+              <a:rPr lang="nl-BE" dirty="0"/>
+              <a:t>Run </a:t>
+            </a:r>
+            <a:r>
+              <a:rPr lang="nl-BE" dirty="0" err="1"/>
+              <a:t>the</a:t>
+            </a:r>
+            <a:r>
+              <a:rPr lang="nl-BE" dirty="0"/>
+              <a:t> </a:t>
+            </a:r>
+            <a:r>
+              <a:rPr lang="nl-BE" dirty="0" err="1"/>
+              <a:t>Azure</a:t>
+            </a:r>
+            <a:r>
+              <a:rPr lang="nl-BE" dirty="0"/>
+              <a:t> </a:t>
+            </a:r>
+            <a:r>
+              <a:rPr lang="nl-BE" dirty="0" err="1"/>
+              <a:t>Functions</a:t>
+            </a:r>
+            <a:r>
+              <a:rPr lang="nl-BE" dirty="0"/>
+              <a:t> Runtime in </a:t>
+            </a:r>
+            <a:r>
+              <a:rPr lang="nl-BE"/>
+              <a:t>a container</a:t>
+            </a:r>
+            <a:endParaRPr lang="nl-BE" dirty="0"/>
+          </a:p>
+          <a:p>
             <a:pPr marL="0" indent="0">
               <a:buNone/>
             </a:pPr>

</xml_diff>

<commit_message>
cleanup the vocabulary intro
</commit_message>
<xml_diff>
--- a/presentation/Application Container Apps.pptx
+++ b/presentation/Application Container Apps.pptx
@@ -15535,7 +15535,7 @@
             <a:pPr algn="l"/>
             <a:r>
               <a:rPr lang="en-US" dirty="0"/>
-              <a:t>Teach a Course</a:t>
+              <a:t>Azure Container Apps a first look</a:t>
             </a:r>
           </a:p>
         </p:txBody>
@@ -15943,7 +15943,7 @@
             <a:pPr algn="l"/>
             <a:r>
               <a:rPr lang="en-US" noProof="0" dirty="0"/>
-              <a:t>Teach a Course</a:t>
+              <a:t>Azure Container Apps a first look</a:t>
             </a:r>
           </a:p>
         </p:txBody>
@@ -16338,7 +16338,7 @@
             <a:pPr algn="l"/>
             <a:r>
               <a:rPr lang="en-US" noProof="0" dirty="0"/>
-              <a:t>Teach a Course</a:t>
+              <a:t>Azure Container Apps a first look</a:t>
             </a:r>
           </a:p>
         </p:txBody>
@@ -16768,7 +16768,7 @@
             <a:pPr algn="l"/>
             <a:r>
               <a:rPr lang="en-US" noProof="0" dirty="0"/>
-              <a:t>Teach a Course</a:t>
+              <a:t>Azure Container Apps a first look</a:t>
             </a:r>
           </a:p>
         </p:txBody>
@@ -17049,7 +17049,7 @@
             <a:pPr algn="l"/>
             <a:r>
               <a:rPr lang="en-US" dirty="0"/>
-              <a:t>Teach a Course</a:t>
+              <a:t>Azure Container Apps a first look</a:t>
             </a:r>
           </a:p>
         </p:txBody>
@@ -17343,7 +17343,7 @@
             <a:pPr algn="l"/>
             <a:r>
               <a:rPr lang="en-US" noProof="0" dirty="0"/>
-              <a:t>Teach a Course</a:t>
+              <a:t>Azure Container Apps a first look</a:t>
             </a:r>
           </a:p>
         </p:txBody>
@@ -17514,7 +17514,7 @@
             <a:pPr algn="l"/>
             <a:r>
               <a:rPr lang="en-US" dirty="0"/>
-              <a:t>Teach a Course</a:t>
+              <a:t>Azure Container Apps a first look</a:t>
             </a:r>
           </a:p>
         </p:txBody>
@@ -18119,7 +18119,7 @@
             <a:pPr algn="l"/>
             <a:r>
               <a:rPr lang="en-US" dirty="0"/>
-              <a:t>Teach a Course</a:t>
+              <a:t>Azure Container Apps a first look</a:t>
             </a:r>
           </a:p>
         </p:txBody>
@@ -18468,7 +18468,7 @@
             <a:pPr algn="l"/>
             <a:r>
               <a:rPr lang="en-US" noProof="0" dirty="0"/>
-              <a:t>Teach a Course</a:t>
+              <a:t>Azure Container Apps a first look</a:t>
             </a:r>
           </a:p>
         </p:txBody>
@@ -18968,7 +18968,7 @@
             <a:pPr algn="l"/>
             <a:r>
               <a:rPr lang="en-US" noProof="0" dirty="0"/>
-              <a:t>Teach a Course</a:t>
+              <a:t>Azure Container Apps a first look</a:t>
             </a:r>
           </a:p>
         </p:txBody>
@@ -19186,7 +19186,7 @@
             <a:pPr algn="l"/>
             <a:r>
               <a:rPr lang="en-US" noProof="0" dirty="0"/>
-              <a:t>Teach a Course</a:t>
+              <a:t>Azure Container Apps a first look</a:t>
             </a:r>
           </a:p>
         </p:txBody>
@@ -19318,7 +19318,7 @@
             <a:pPr algn="l"/>
             <a:r>
               <a:rPr lang="en-US" noProof="0" dirty="0"/>
-              <a:t>Teach a Course</a:t>
+              <a:t>Azure Container Apps a first look</a:t>
             </a:r>
           </a:p>
         </p:txBody>
@@ -19743,7 +19743,7 @@
             <a:pPr algn="l"/>
             <a:r>
               <a:rPr lang="en-US" noProof="0" dirty="0"/>
-              <a:t>Teach a Course</a:t>
+              <a:t>Azure Container Apps a first look</a:t>
             </a:r>
           </a:p>
         </p:txBody>
@@ -20140,7 +20140,7 @@
           <a:p>
             <a:r>
               <a:rPr lang="en-US" dirty="0"/>
-              <a:t>Teach a Course</a:t>
+              <a:t>Azure Container Apps a first look</a:t>
             </a:r>
           </a:p>
         </p:txBody>
@@ -21179,8 +21179,8 @@
               </a:spcAft>
             </a:pPr>
             <a:r>
-              <a:rPr lang="en-US"/>
-              <a:t>Teach a Course</a:t>
+              <a:rPr lang="en-US" dirty="0"/>
+              <a:t>Azure Container Apps a first look</a:t>
             </a:r>
           </a:p>
         </p:txBody>
@@ -21657,8 +21657,8 @@
               </a:spcAft>
             </a:pPr>
             <a:r>
-              <a:rPr lang="en-US"/>
-              <a:t>Teach a Course</a:t>
+              <a:rPr lang="en-US" dirty="0"/>
+              <a:t>Azure Container Apps a first look</a:t>
             </a:r>
           </a:p>
         </p:txBody>
@@ -22116,8 +22116,8 @@
               </a:spcAft>
             </a:pPr>
             <a:r>
-              <a:rPr lang="en-US"/>
-              <a:t>Teach a Course</a:t>
+              <a:rPr lang="en-US" dirty="0"/>
+              <a:t>Azure Container Apps a first look</a:t>
             </a:r>
           </a:p>
         </p:txBody>
@@ -22484,8 +22484,8 @@
               </a:spcAft>
             </a:pPr>
             <a:r>
-              <a:rPr lang="en-US"/>
-              <a:t>Teach a Course</a:t>
+              <a:rPr lang="en-US" dirty="0"/>
+              <a:t>Azure Container Apps a first look</a:t>
             </a:r>
           </a:p>
         </p:txBody>
@@ -22978,7 +22978,7 @@
             <a:pPr algn="l"/>
             <a:r>
               <a:rPr lang="en-US" dirty="0"/>
-              <a:t>Teach a Course</a:t>
+              <a:t>Azure Container Apps a first look</a:t>
             </a:r>
           </a:p>
         </p:txBody>
@@ -25278,8 +25278,8 @@
               </a:spcAft>
             </a:pPr>
             <a:r>
-              <a:rPr lang="en-US" noProof="0"/>
-              <a:t>Teach a Course</a:t>
+              <a:rPr lang="en-US" noProof="0" dirty="0"/>
+              <a:t>Azure Container Apps a first look</a:t>
             </a:r>
           </a:p>
         </p:txBody>
@@ -25465,10 +25465,9 @@
           <a:p>
             <a:pPr algn="l"/>
             <a:r>
-              <a:rPr lang="en-US"/>
-              <a:t>Teach a Course</a:t>
-            </a:r>
-            <a:endParaRPr lang="en-US" dirty="0"/>
+              <a:rPr lang="en-US" dirty="0"/>
+              <a:t>Azure Container Apps a first look</a:t>
+            </a:r>
           </a:p>
         </p:txBody>
       </p:sp>
@@ -25611,8 +25610,8 @@
               </a:spcAft>
             </a:pPr>
             <a:r>
-              <a:rPr lang="en-US"/>
-              <a:t>Teach a Course</a:t>
+              <a:rPr lang="en-US" dirty="0"/>
+              <a:t>Azure Container Apps a first look</a:t>
             </a:r>
           </a:p>
         </p:txBody>
@@ -25766,10 +25765,9 @@
           <a:p>
             <a:pPr algn="l"/>
             <a:r>
-              <a:rPr lang="en-US"/>
-              <a:t>Teach a Course</a:t>
-            </a:r>
-            <a:endParaRPr lang="en-US" dirty="0"/>
+              <a:rPr lang="en-US" dirty="0"/>
+              <a:t>Azure Container Apps a first look</a:t>
+            </a:r>
           </a:p>
         </p:txBody>
       </p:sp>
@@ -25822,6 +25820,45 @@
           <a:bodyPr/>
           <a:lstStyle/>
           <a:p>
+            <a:r>
+              <a:rPr lang="en-US" b="0" i="0" dirty="0">
+                <a:effectLst/>
+                <a:latin typeface="museo_slab300"/>
+              </a:rPr>
+              <a:t>CNCF is an open source software foundation dedicated to making cloud-native computing universal and sustainable. </a:t>
+            </a:r>
+          </a:p>
+          <a:p>
+            <a:r>
+              <a:rPr lang="en-US" dirty="0">
+                <a:latin typeface="museo_slab300"/>
+              </a:rPr>
+              <a:t>Vendor neutral home for the fastest growing open source projects</a:t>
+            </a:r>
+            <a:endParaRPr lang="en-US" b="0" i="0" dirty="0">
+              <a:effectLst/>
+              <a:latin typeface="museo_slab300"/>
+            </a:endParaRPr>
+          </a:p>
+          <a:p>
+            <a:r>
+              <a:rPr lang="en-US" dirty="0">
+                <a:latin typeface="museo_slab300"/>
+              </a:rPr>
+              <a:t>Complete landscape </a:t>
+            </a:r>
+            <a:r>
+              <a:rPr lang="en-US" dirty="0">
+                <a:latin typeface="museo_slab300"/>
+                <a:hlinkClick r:id="rId2"/>
+              </a:rPr>
+              <a:t>https://landscape.cncf.io/</a:t>
+            </a:r>
+            <a:endParaRPr lang="en-US" dirty="0">
+              <a:latin typeface="museo_slab300"/>
+            </a:endParaRPr>
+          </a:p>
+          <a:p>
             <a:endParaRPr lang="nl-BE" dirty="0"/>
           </a:p>
         </p:txBody>
@@ -25841,7 +25878,7 @@
           <p:nvPr/>
         </p:nvPicPr>
         <p:blipFill>
-          <a:blip r:embed="rId2">
+          <a:blip r:embed="rId3">
             <a:extLst>
               <a:ext uri="{28A0092B-C50C-407E-A947-70E740481C1C}">
                 <a14:useLocalDpi xmlns:a14="http://schemas.microsoft.com/office/drawing/2010/main" val="0"/>
@@ -25955,10 +25992,9 @@
           <a:p>
             <a:pPr algn="l"/>
             <a:r>
-              <a:rPr lang="en-US"/>
-              <a:t>Teach a Course</a:t>
-            </a:r>
-            <a:endParaRPr lang="en-US" dirty="0"/>
+              <a:rPr lang="en-US" dirty="0"/>
+              <a:t>Azure Container Apps a first look</a:t>
+            </a:r>
           </a:p>
         </p:txBody>
       </p:sp>
@@ -26017,7 +26053,127 @@
           <a:bodyPr/>
           <a:lstStyle/>
           <a:p>
+            <a:r>
+              <a:rPr lang="nl-BE" dirty="0"/>
+              <a:t>Distributed Application Runtime </a:t>
+            </a:r>
+            <a:r>
+              <a:rPr lang="nl-BE" dirty="0" err="1"/>
+              <a:t>provides</a:t>
+            </a:r>
+            <a:r>
+              <a:rPr lang="nl-BE" dirty="0"/>
+              <a:t> </a:t>
+            </a:r>
+            <a:r>
+              <a:rPr lang="nl-BE" dirty="0" err="1"/>
+              <a:t>API’s</a:t>
+            </a:r>
+            <a:r>
+              <a:rPr lang="nl-BE" dirty="0"/>
+              <a:t> </a:t>
+            </a:r>
+            <a:br>
+              <a:rPr lang="nl-BE" dirty="0"/>
+            </a:br>
+            <a:r>
+              <a:rPr lang="nl-BE" dirty="0" err="1"/>
+              <a:t>that</a:t>
+            </a:r>
+            <a:r>
+              <a:rPr lang="nl-BE" dirty="0"/>
+              <a:t> </a:t>
+            </a:r>
+            <a:r>
+              <a:rPr lang="nl-BE" dirty="0" err="1"/>
+              <a:t>simplify</a:t>
+            </a:r>
+            <a:r>
+              <a:rPr lang="nl-BE" dirty="0"/>
+              <a:t> microservice </a:t>
+            </a:r>
+            <a:r>
+              <a:rPr lang="nl-BE" dirty="0" err="1"/>
+              <a:t>connectivity</a:t>
+            </a:r>
             <a:endParaRPr lang="nl-BE" dirty="0"/>
+          </a:p>
+          <a:p>
+            <a:r>
+              <a:rPr lang="nl-BE" dirty="0" err="1"/>
+              <a:t>To</a:t>
+            </a:r>
+            <a:r>
+              <a:rPr lang="nl-BE" dirty="0"/>
+              <a:t> tackle </a:t>
+            </a:r>
+            <a:r>
+              <a:rPr lang="nl-BE" dirty="0" err="1"/>
+              <a:t>challenges</a:t>
+            </a:r>
+            <a:r>
+              <a:rPr lang="nl-BE" dirty="0"/>
+              <a:t> like: </a:t>
+            </a:r>
+          </a:p>
+          <a:p>
+            <a:pPr lvl="1"/>
+            <a:r>
+              <a:rPr lang="nl-BE" dirty="0"/>
+              <a:t>service </a:t>
+            </a:r>
+            <a:r>
+              <a:rPr lang="nl-BE" dirty="0" err="1"/>
+              <a:t>discovery</a:t>
+            </a:r>
+            <a:r>
+              <a:rPr lang="nl-BE" dirty="0"/>
+              <a:t>, </a:t>
+            </a:r>
+          </a:p>
+          <a:p>
+            <a:pPr lvl="1"/>
+            <a:r>
+              <a:rPr lang="nl-BE" dirty="0" err="1"/>
+              <a:t>message</a:t>
+            </a:r>
+            <a:r>
+              <a:rPr lang="nl-BE" dirty="0"/>
+              <a:t> broker,</a:t>
+            </a:r>
+          </a:p>
+          <a:p>
+            <a:pPr lvl="1"/>
+            <a:r>
+              <a:rPr lang="nl-BE" dirty="0" err="1"/>
+              <a:t>encryption</a:t>
+            </a:r>
+            <a:r>
+              <a:rPr lang="nl-BE" dirty="0"/>
+              <a:t>, </a:t>
+            </a:r>
+          </a:p>
+          <a:p>
+            <a:pPr lvl="1"/>
+            <a:r>
+              <a:rPr lang="nl-BE" dirty="0" err="1"/>
+              <a:t>observability</a:t>
+            </a:r>
+            <a:r>
+              <a:rPr lang="nl-BE" dirty="0"/>
+              <a:t>, </a:t>
+            </a:r>
+          </a:p>
+          <a:p>
+            <a:pPr lvl="1"/>
+            <a:r>
+              <a:rPr lang="nl-BE" dirty="0" err="1"/>
+              <a:t>secret</a:t>
+            </a:r>
+            <a:r>
+              <a:rPr lang="nl-BE" dirty="0"/>
+              <a:t> management</a:t>
+            </a:r>
           </a:p>
         </p:txBody>
       </p:sp>
@@ -26158,6 +26314,53 @@
           </a:extLst>
         </p:spPr>
       </p:pic>
+      <p:pic>
+        <p:nvPicPr>
+          <p:cNvPr id="3084" name="Picture 12">
+            <a:extLst>
+              <a:ext uri="{FF2B5EF4-FFF2-40B4-BE49-F238E27FC236}">
+                <a16:creationId xmlns:a16="http://schemas.microsoft.com/office/drawing/2014/main" id="{067EA26F-7695-462D-8AAC-CCD7ADDCB5FE}"/>
+              </a:ext>
+            </a:extLst>
+          </p:cNvPr>
+          <p:cNvPicPr>
+            <a:picLocks noChangeAspect="1" noChangeArrowheads="1"/>
+          </p:cNvPicPr>
+          <p:nvPr/>
+        </p:nvPicPr>
+        <p:blipFill>
+          <a:blip r:embed="rId3">
+            <a:extLst>
+              <a:ext uri="{28A0092B-C50C-407E-A947-70E740481C1C}">
+                <a14:useLocalDpi xmlns:a14="http://schemas.microsoft.com/office/drawing/2010/main" val="0"/>
+              </a:ext>
+            </a:extLst>
+          </a:blip>
+          <a:srcRect/>
+          <a:stretch>
+            <a:fillRect/>
+          </a:stretch>
+        </p:blipFill>
+        <p:spPr bwMode="auto">
+          <a:xfrm>
+            <a:off x="5311740" y="2251240"/>
+            <a:ext cx="6612538" cy="3716680"/>
+          </a:xfrm>
+          <a:prstGeom prst="rect">
+            <a:avLst/>
+          </a:prstGeom>
+          <a:noFill/>
+          <a:extLst>
+            <a:ext uri="{909E8E84-426E-40DD-AFC4-6F175D3DCCD1}">
+              <a14:hiddenFill xmlns:a14="http://schemas.microsoft.com/office/drawing/2010/main">
+                <a:solidFill>
+                  <a:srgbClr val="FFFFFF"/>
+                </a:solidFill>
+              </a14:hiddenFill>
+            </a:ext>
+          </a:extLst>
+        </p:spPr>
+      </p:pic>
     </p:spTree>
     <p:extLst>
       <p:ext uri="{BB962C8B-B14F-4D97-AF65-F5344CB8AC3E}">
@@ -26240,10 +26443,9 @@
           <a:p>
             <a:pPr algn="l"/>
             <a:r>
-              <a:rPr lang="en-US"/>
-              <a:t>Teach a Course</a:t>
-            </a:r>
-            <a:endParaRPr lang="en-US" dirty="0"/>
+              <a:rPr lang="en-US" dirty="0"/>
+              <a:t>Azure Container Apps a first look</a:t>
+            </a:r>
           </a:p>
         </p:txBody>
       </p:sp>
@@ -26297,6 +26499,156 @@
           <a:bodyPr/>
           <a:lstStyle/>
           <a:p>
+            <a:r>
+              <a:rPr lang="nl-BE" dirty="0"/>
+              <a:t>Is a proxy and </a:t>
+            </a:r>
+            <a:r>
+              <a:rPr lang="nl-BE" dirty="0" err="1"/>
+              <a:t>communication</a:t>
+            </a:r>
+            <a:r>
+              <a:rPr lang="nl-BE" dirty="0"/>
+              <a:t> bus </a:t>
+            </a:r>
+            <a:r>
+              <a:rPr lang="nl-BE" dirty="0" err="1"/>
+              <a:t>designed</a:t>
+            </a:r>
+            <a:r>
+              <a:rPr lang="nl-BE" dirty="0"/>
+              <a:t> </a:t>
+            </a:r>
+            <a:r>
+              <a:rPr lang="nl-BE" dirty="0" err="1"/>
+              <a:t>for</a:t>
+            </a:r>
+            <a:r>
+              <a:rPr lang="nl-BE" dirty="0"/>
+              <a:t> large modern service </a:t>
+            </a:r>
+            <a:r>
+              <a:rPr lang="nl-BE" dirty="0" err="1"/>
+              <a:t>oriented</a:t>
+            </a:r>
+            <a:r>
+              <a:rPr lang="nl-BE" dirty="0"/>
+              <a:t> </a:t>
+            </a:r>
+            <a:r>
+              <a:rPr lang="nl-BE" dirty="0" err="1"/>
+              <a:t>architectures</a:t>
+            </a:r>
+            <a:endParaRPr lang="nl-BE" dirty="0"/>
+          </a:p>
+          <a:p>
+            <a:r>
+              <a:rPr lang="nl-BE" dirty="0" err="1"/>
+              <a:t>Self-contained</a:t>
+            </a:r>
+            <a:r>
+              <a:rPr lang="nl-BE" dirty="0"/>
+              <a:t> </a:t>
+            </a:r>
+            <a:r>
+              <a:rPr lang="nl-BE" dirty="0" err="1"/>
+              <a:t>process</a:t>
+            </a:r>
+            <a:r>
+              <a:rPr lang="nl-BE" dirty="0"/>
+              <a:t> </a:t>
+            </a:r>
+            <a:r>
+              <a:rPr lang="nl-BE" dirty="0" err="1"/>
+              <a:t>that</a:t>
+            </a:r>
+            <a:r>
+              <a:rPr lang="nl-BE" dirty="0"/>
+              <a:t> runs </a:t>
+            </a:r>
+            <a:r>
+              <a:rPr lang="nl-BE" dirty="0" err="1"/>
+              <a:t>along</a:t>
+            </a:r>
+            <a:r>
+              <a:rPr lang="nl-BE" dirty="0"/>
+              <a:t> </a:t>
+            </a:r>
+            <a:r>
+              <a:rPr lang="nl-BE" dirty="0" err="1"/>
+              <a:t>the</a:t>
+            </a:r>
+            <a:r>
+              <a:rPr lang="nl-BE" dirty="0"/>
+              <a:t> </a:t>
+            </a:r>
+            <a:r>
+              <a:rPr lang="nl-BE" dirty="0" err="1"/>
+              <a:t>application</a:t>
+            </a:r>
+            <a:r>
+              <a:rPr lang="nl-BE" dirty="0"/>
+              <a:t> server </a:t>
+            </a:r>
+          </a:p>
+          <a:p>
+            <a:r>
+              <a:rPr lang="nl-BE" dirty="0" err="1"/>
+              <a:t>With</a:t>
+            </a:r>
+            <a:r>
+              <a:rPr lang="nl-BE" dirty="0"/>
+              <a:t> features like HTTP, TCP routing, filtering, HTTP/2 support, GRPC support, Service </a:t>
+            </a:r>
+            <a:r>
+              <a:rPr lang="nl-BE" dirty="0" err="1"/>
+              <a:t>discovery</a:t>
+            </a:r>
+            <a:r>
+              <a:rPr lang="nl-BE" dirty="0"/>
+              <a:t>, health </a:t>
+            </a:r>
+            <a:r>
+              <a:rPr lang="nl-BE" dirty="0" err="1"/>
+              <a:t>checking</a:t>
+            </a:r>
+            <a:r>
+              <a:rPr lang="nl-BE" dirty="0"/>
+              <a:t>,  load </a:t>
+            </a:r>
+            <a:r>
+              <a:rPr lang="nl-BE" dirty="0" err="1"/>
+              <a:t>balancing</a:t>
+            </a:r>
+            <a:r>
+              <a:rPr lang="nl-BE" dirty="0"/>
+              <a:t>, </a:t>
+            </a:r>
+            <a:r>
+              <a:rPr lang="nl-BE" dirty="0" err="1"/>
+              <a:t>observability</a:t>
+            </a:r>
+            <a:r>
+              <a:rPr lang="nl-BE" dirty="0"/>
+              <a:t>, … </a:t>
+            </a:r>
+          </a:p>
+          <a:p>
+            <a:endParaRPr lang="nl-BE" dirty="0"/>
+          </a:p>
+          <a:p>
+            <a:r>
+              <a:rPr lang="nl-BE" dirty="0">
+                <a:hlinkClick r:id="rId2"/>
+              </a:rPr>
+              <a:t>https://www.envoyproxy.io/docs/envoy/latest/intro/what_is_envoy</a:t>
+            </a:r>
+            <a:endParaRPr lang="nl-BE" dirty="0"/>
+          </a:p>
+          <a:p>
+            <a:pPr marL="0" indent="0">
+              <a:buNone/>
+            </a:pPr>
             <a:endParaRPr lang="nl-BE" dirty="0"/>
           </a:p>
         </p:txBody>
@@ -26316,7 +26668,7 @@
           <p:nvPr/>
         </p:nvPicPr>
         <p:blipFill>
-          <a:blip r:embed="rId2">
+          <a:blip r:embed="rId3">
             <a:extLst>
               <a:ext uri="{28A0092B-C50C-407E-A947-70E740481C1C}">
                 <a14:useLocalDpi xmlns:a14="http://schemas.microsoft.com/office/drawing/2010/main" val="0"/>
@@ -26430,10 +26782,9 @@
           <a:p>
             <a:pPr algn="l"/>
             <a:r>
-              <a:rPr lang="en-US"/>
-              <a:t>Teach a Course</a:t>
-            </a:r>
-            <a:endParaRPr lang="en-US" dirty="0"/>
+              <a:rPr lang="en-US" dirty="0"/>
+              <a:t>Azure Container Apps a first look</a:t>
+            </a:r>
           </a:p>
         </p:txBody>
       </p:sp>
@@ -26756,10 +27107,9 @@
           <a:p>
             <a:pPr algn="l"/>
             <a:r>
-              <a:rPr lang="en-US"/>
-              <a:t>Teach a Course</a:t>
-            </a:r>
-            <a:endParaRPr lang="en-US" dirty="0"/>
+              <a:rPr lang="en-US" dirty="0"/>
+              <a:t>Azure Container Apps a first look</a:t>
+            </a:r>
           </a:p>
         </p:txBody>
       </p:sp>
@@ -26838,6 +27188,219 @@
               </a14:hiddenFill>
             </a:ext>
           </a:extLst>
+        </p:spPr>
+      </p:pic>
+      <p:sp>
+        <p:nvSpPr>
+          <p:cNvPr id="6" name="TextBox 5">
+            <a:extLst>
+              <a:ext uri="{FF2B5EF4-FFF2-40B4-BE49-F238E27FC236}">
+                <a16:creationId xmlns:a16="http://schemas.microsoft.com/office/drawing/2014/main" id="{5D93DF0B-1289-491A-BBC4-83554ED9C172}"/>
+              </a:ext>
+            </a:extLst>
+          </p:cNvPr>
+          <p:cNvSpPr txBox="1"/>
+          <p:nvPr/>
+        </p:nvSpPr>
+        <p:spPr>
+          <a:xfrm>
+            <a:off x="581192" y="2352780"/>
+            <a:ext cx="6158276" cy="2308324"/>
+          </a:xfrm>
+          <a:prstGeom prst="rect">
+            <a:avLst/>
+          </a:prstGeom>
+          <a:noFill/>
+        </p:spPr>
+        <p:txBody>
+          <a:bodyPr wrap="square" rtlCol="0">
+            <a:spAutoFit/>
+          </a:bodyPr>
+          <a:lstStyle/>
+          <a:p>
+            <a:r>
+              <a:rPr lang="nl-BE" dirty="0" err="1"/>
+              <a:t>Declarative</a:t>
+            </a:r>
+            <a:r>
+              <a:rPr lang="nl-BE" dirty="0"/>
+              <a:t> </a:t>
+            </a:r>
+            <a:r>
+              <a:rPr lang="nl-BE" dirty="0" err="1"/>
+              <a:t>language</a:t>
+            </a:r>
+            <a:endParaRPr lang="nl-BE" dirty="0"/>
+          </a:p>
+          <a:p>
+            <a:r>
+              <a:rPr lang="nl-BE" dirty="0" err="1"/>
+              <a:t>When</a:t>
+            </a:r>
+            <a:r>
+              <a:rPr lang="nl-BE" dirty="0"/>
+              <a:t> </a:t>
+            </a:r>
+            <a:r>
+              <a:rPr lang="nl-BE" dirty="0" err="1"/>
+              <a:t>compiled</a:t>
+            </a:r>
+            <a:r>
+              <a:rPr lang="nl-BE" dirty="0"/>
+              <a:t> </a:t>
+            </a:r>
+            <a:r>
+              <a:rPr lang="nl-BE" dirty="0" err="1"/>
+              <a:t>it’s</a:t>
+            </a:r>
+            <a:r>
+              <a:rPr lang="nl-BE" dirty="0"/>
+              <a:t> </a:t>
+            </a:r>
+            <a:r>
+              <a:rPr lang="nl-BE" dirty="0" err="1"/>
+              <a:t>translated</a:t>
+            </a:r>
+            <a:r>
+              <a:rPr lang="nl-BE" dirty="0"/>
+              <a:t> </a:t>
+            </a:r>
+            <a:r>
+              <a:rPr lang="nl-BE" dirty="0" err="1"/>
+              <a:t>to</a:t>
+            </a:r>
+            <a:r>
+              <a:rPr lang="nl-BE" dirty="0"/>
+              <a:t> ARM templates</a:t>
+            </a:r>
+          </a:p>
+          <a:p>
+            <a:r>
+              <a:rPr lang="nl-BE" dirty="0"/>
+              <a:t>Even </a:t>
+            </a:r>
+            <a:r>
+              <a:rPr lang="nl-BE" dirty="0" err="1"/>
+              <a:t>Beta</a:t>
+            </a:r>
+            <a:r>
+              <a:rPr lang="nl-BE" dirty="0"/>
+              <a:t> features </a:t>
+            </a:r>
+            <a:r>
+              <a:rPr lang="nl-BE" dirty="0" err="1"/>
+              <a:t>can</a:t>
+            </a:r>
+            <a:r>
+              <a:rPr lang="nl-BE" dirty="0"/>
+              <a:t> </a:t>
+            </a:r>
+            <a:r>
+              <a:rPr lang="nl-BE" dirty="0" err="1"/>
+              <a:t>be</a:t>
+            </a:r>
+            <a:r>
+              <a:rPr lang="nl-BE" dirty="0"/>
+              <a:t> </a:t>
+            </a:r>
+            <a:r>
+              <a:rPr lang="nl-BE" dirty="0" err="1"/>
+              <a:t>deployed</a:t>
+            </a:r>
+            <a:r>
+              <a:rPr lang="nl-BE" dirty="0"/>
+              <a:t> </a:t>
+            </a:r>
+            <a:r>
+              <a:rPr lang="nl-BE" dirty="0" err="1"/>
+              <a:t>with</a:t>
+            </a:r>
+            <a:r>
+              <a:rPr lang="nl-BE" dirty="0"/>
+              <a:t> </a:t>
+            </a:r>
+            <a:r>
+              <a:rPr lang="nl-BE" dirty="0" err="1"/>
+              <a:t>bicep</a:t>
+            </a:r>
+            <a:endParaRPr lang="nl-BE" dirty="0"/>
+          </a:p>
+          <a:p>
+            <a:endParaRPr lang="nl-BE" dirty="0"/>
+          </a:p>
+          <a:p>
+            <a:endParaRPr lang="nl-BE" dirty="0"/>
+          </a:p>
+          <a:p>
+            <a:endParaRPr lang="nl-BE" dirty="0"/>
+          </a:p>
+          <a:p>
+            <a:endParaRPr lang="nl-BE" dirty="0"/>
+          </a:p>
+          <a:p>
+            <a:r>
+              <a:rPr lang="nl-BE" dirty="0" err="1"/>
+              <a:t>Difference</a:t>
+            </a:r>
+            <a:r>
+              <a:rPr lang="nl-BE" dirty="0"/>
+              <a:t> </a:t>
+            </a:r>
+            <a:r>
+              <a:rPr lang="nl-BE" dirty="0" err="1"/>
+              <a:t>with</a:t>
+            </a:r>
+            <a:r>
+              <a:rPr lang="nl-BE" dirty="0"/>
+              <a:t> </a:t>
+            </a:r>
+            <a:r>
+              <a:rPr lang="nl-BE" dirty="0" err="1"/>
+              <a:t>Terraform</a:t>
+            </a:r>
+            <a:r>
+              <a:rPr lang="nl-BE" dirty="0"/>
+              <a:t> – single </a:t>
+            </a:r>
+            <a:r>
+              <a:rPr lang="nl-BE" dirty="0" err="1"/>
+              <a:t>vendor</a:t>
+            </a:r>
+            <a:r>
+              <a:rPr lang="nl-BE" dirty="0"/>
+              <a:t> (Microsoft), no state </a:t>
+            </a:r>
+          </a:p>
+        </p:txBody>
+      </p:sp>
+      <p:pic>
+        <p:nvPicPr>
+          <p:cNvPr id="8" name="Picture 7">
+            <a:extLst>
+              <a:ext uri="{FF2B5EF4-FFF2-40B4-BE49-F238E27FC236}">
+                <a16:creationId xmlns:a16="http://schemas.microsoft.com/office/drawing/2014/main" id="{F6C086D7-D9C8-4FC0-B571-7E41C2DD2D6D}"/>
+              </a:ext>
+            </a:extLst>
+          </p:cNvPr>
+          <p:cNvPicPr>
+            <a:picLocks noChangeAspect="1"/>
+          </p:cNvPicPr>
+          <p:nvPr/>
+        </p:nvPicPr>
+        <p:blipFill>
+          <a:blip r:embed="rId3"/>
+          <a:stretch>
+            <a:fillRect/>
+          </a:stretch>
+        </p:blipFill>
+        <p:spPr>
+          <a:xfrm>
+            <a:off x="6844210" y="2034283"/>
+            <a:ext cx="5003663" cy="3215811"/>
+          </a:xfrm>
+          <a:prstGeom prst="rect">
+            <a:avLst/>
+          </a:prstGeom>
         </p:spPr>
       </p:pic>
     </p:spTree>
@@ -26950,8 +27513,8 @@
               </a:spcAft>
             </a:pPr>
             <a:r>
-              <a:rPr lang="en-US"/>
-              <a:t>Teach a Course</a:t>
+              <a:rPr lang="en-US" dirty="0"/>
+              <a:t>Azure Container Apps a first look</a:t>
             </a:r>
           </a:p>
         </p:txBody>
@@ -27174,8 +27737,8 @@
               </a:spcAft>
             </a:pPr>
             <a:r>
-              <a:rPr lang="en-US"/>
-              <a:t>Teach a Course</a:t>
+              <a:rPr lang="en-US" dirty="0"/>
+              <a:t>Azure Container Apps a first look</a:t>
             </a:r>
           </a:p>
         </p:txBody>

</xml_diff>